<commit_message>
Added Training Artifacts - Day 23.
</commit_message>
<xml_diff>
--- a/Day 22/Slides/7.More on Components/more-on-components-slides.pptx
+++ b/Day 22/Slides/7.More on Components/more-on-components-slides.pptx
@@ -11089,102 +11089,6 @@
           </p:txBody>
         </p:sp>
       </p:grpSp>
-      <p:sp>
-        <p:nvSpPr>
-          <p:cNvPr id="16" name="object 16"/>
-          <p:cNvSpPr/>
-          <p:nvPr/>
-        </p:nvSpPr>
-        <p:spPr>
-          <a:xfrm>
-            <a:off x="2953171" y="1779760"/>
-            <a:ext cx="15193010" cy="924560"/>
-          </a:xfrm>
-          <a:custGeom>
-            <a:avLst/>
-            <a:gdLst/>
-            <a:ahLst/>
-            <a:cxnLst/>
-            <a:rect l="l" t="t" r="r" b="b"/>
-            <a:pathLst>
-              <a:path w="15193010" h="924560">
-                <a:moveTo>
-                  <a:pt x="15192613" y="0"/>
-                </a:moveTo>
-                <a:lnTo>
-                  <a:pt x="0" y="0"/>
-                </a:lnTo>
-                <a:lnTo>
-                  <a:pt x="0" y="924157"/>
-                </a:lnTo>
-                <a:lnTo>
-                  <a:pt x="15192613" y="924157"/>
-                </a:lnTo>
-                <a:lnTo>
-                  <a:pt x="15192613" y="0"/>
-                </a:lnTo>
-                <a:close/>
-              </a:path>
-            </a:pathLst>
-          </a:custGeom>
-          <a:solidFill>
-            <a:srgbClr val="FFFFFF"/>
-          </a:solidFill>
-        </p:spPr>
-        <p:txBody>
-          <a:bodyPr wrap="square" lIns="0" tIns="0" rIns="0" bIns="0" rtlCol="0"/>
-          <a:lstStyle/>
-          <a:p/>
-        </p:txBody>
-      </p:sp>
-      <p:sp>
-        <p:nvSpPr>
-          <p:cNvPr id="17" name="object 17"/>
-          <p:cNvSpPr/>
-          <p:nvPr/>
-        </p:nvSpPr>
-        <p:spPr>
-          <a:xfrm>
-            <a:off x="3481358" y="5808903"/>
-            <a:ext cx="14458315" cy="1754505"/>
-          </a:xfrm>
-          <a:custGeom>
-            <a:avLst/>
-            <a:gdLst/>
-            <a:ahLst/>
-            <a:cxnLst/>
-            <a:rect l="l" t="t" r="r" b="b"/>
-            <a:pathLst>
-              <a:path w="14458315" h="1754504">
-                <a:moveTo>
-                  <a:pt x="14457950" y="0"/>
-                </a:moveTo>
-                <a:lnTo>
-                  <a:pt x="0" y="0"/>
-                </a:lnTo>
-                <a:lnTo>
-                  <a:pt x="0" y="1754497"/>
-                </a:lnTo>
-                <a:lnTo>
-                  <a:pt x="14457950" y="1754497"/>
-                </a:lnTo>
-                <a:lnTo>
-                  <a:pt x="14457950" y="0"/>
-                </a:lnTo>
-                <a:close/>
-              </a:path>
-            </a:pathLst>
-          </a:custGeom>
-          <a:solidFill>
-            <a:srgbClr val="FFFFFF"/>
-          </a:solidFill>
-        </p:spPr>
-        <p:txBody>
-          <a:bodyPr wrap="square" lIns="0" tIns="0" rIns="0" bIns="0" rtlCol="0"/>
-          <a:lstStyle/>
-          <a:p/>
-        </p:txBody>
-      </p:sp>
       <p:sp>
         <p:nvSpPr>
           <p:cNvPr id="18" name="Slide Number Placeholder 17"/>

</xml_diff>